<commit_message>
update lec 2 and 3
</commit_message>
<xml_diff>
--- a/lectures/lec2/Lec2-BasicConcepts.pptx
+++ b/lectures/lec2/Lec2-BasicConcepts.pptx
@@ -326,7 +326,7 @@
             <a:fld id="{F33530C9-BF13-40EE-A1EC-EBBB0134EBBA}" type="datetime1">
               <a:rPr lang="en-US"/>
               <a:pPr/>
-              <a:t>8/22/2015</a:t>
+              <a:t>10/9/2015</a:t>
             </a:fld>
             <a:endParaRPr lang="en-US"/>
           </a:p>
@@ -544,7 +544,7 @@
             <a:fld id="{7DD20F8F-B3A0-465C-A2C5-4272F8BE0711}" type="datetime1">
               <a:rPr lang="en-US"/>
               <a:pPr/>
-              <a:t>8/22/2015</a:t>
+              <a:t>10/9/2015</a:t>
             </a:fld>
             <a:endParaRPr lang="en-US"/>
           </a:p>
@@ -943,7 +943,7 @@
             <a:fld id="{7DD20F8F-B3A0-465C-A2C5-4272F8BE0711}" type="datetime1">
               <a:rPr lang="en-US" smtClean="0"/>
               <a:pPr/>
-              <a:t>8/22/2015</a:t>
+              <a:t>10/9/2015</a:t>
             </a:fld>
             <a:endParaRPr lang="en-US"/>
           </a:p>
@@ -1060,7 +1060,7 @@
             <a:fld id="{7DD20F8F-B3A0-465C-A2C5-4272F8BE0711}" type="datetime1">
               <a:rPr lang="en-US" smtClean="0"/>
               <a:pPr/>
-              <a:t>8/22/2015</a:t>
+              <a:t>10/9/2015</a:t>
             </a:fld>
             <a:endParaRPr lang="en-US"/>
           </a:p>
@@ -1169,7 +1169,7 @@
             <a:fld id="{7DD20F8F-B3A0-465C-A2C5-4272F8BE0711}" type="datetime1">
               <a:rPr lang="en-US" smtClean="0"/>
               <a:pPr/>
-              <a:t>8/22/2015</a:t>
+              <a:t>10/9/2015</a:t>
             </a:fld>
             <a:endParaRPr lang="en-US"/>
           </a:p>
@@ -3337,20 +3337,6 @@
               </a:rPr>
               <a:t> </a:t>
             </a:r>
-            <a:endParaRPr kumimoji="0" lang="en-US" altLang="zh-CN" sz="1800" u="none" strike="noStrike" kern="0" cap="none" spc="0" normalizeH="0" baseline="0" noProof="0" dirty="0" smtClean="0">
-              <a:ln>
-                <a:noFill/>
-              </a:ln>
-              <a:solidFill>
-                <a:srgbClr val="FF0000"/>
-              </a:solidFill>
-              <a:effectLst/>
-              <a:uLnTx/>
-              <a:uFillTx/>
-              <a:latin typeface="+mn-lt"/>
-              <a:ea typeface="宋体" pitchFamily="-128" charset="-122"/>
-              <a:cs typeface="+mn-cs"/>
-            </a:endParaRPr>
           </a:p>
         </p:txBody>
       </p:sp>
@@ -3458,7 +3444,7 @@
           <a:graphicData uri="http://schemas.openxmlformats.org/presentationml/2006/ole">
             <mc:AlternateContent xmlns:mc="http://schemas.openxmlformats.org/markup-compatibility/2006">
               <mc:Choice xmlns:v="urn:schemas-microsoft-com:vml" Requires="v">
-                <p:oleObj spid="_x0000_s1034" name="Equation" r:id="rId3" imgW="1574640" imgH="1346040" progId="Equation.DSMT4">
+                <p:oleObj spid="_x0000_s1035" name="Equation" r:id="rId3" imgW="1574640" imgH="1346040" progId="Equation.DSMT4">
                   <p:embed/>
                 </p:oleObj>
               </mc:Choice>
@@ -3768,6 +3754,14 @@
               <a:buChar char="•"/>
             </a:pPr>
             <a:r>
+              <a:rPr lang="en-US" altLang="zh-CN" sz="2400" dirty="0">
+                <a:solidFill>
+                  <a:srgbClr val="091D58"/>
+                </a:solidFill>
+              </a:rPr>
+              <a:t>4</a:t>
+            </a:r>
+            <a:r>
               <a:rPr kumimoji="0" lang="en-US" altLang="zh-CN" sz="2400" u="none" strike="noStrike" kern="0" cap="none" spc="0" normalizeH="0" baseline="0" noProof="0" dirty="0" smtClean="0">
                 <a:ln>
                   <a:noFill/>
@@ -3779,7 +3773,21 @@
                 <a:uLnTx/>
                 <a:uFillTx/>
               </a:rPr>
-              <a:t>6 × ≈ 6 dB</a:t>
+              <a:t> </a:t>
+            </a:r>
+            <a:r>
+              <a:rPr kumimoji="0" lang="en-US" altLang="zh-CN" sz="2400" u="none" strike="noStrike" kern="0" cap="none" spc="0" normalizeH="0" baseline="0" noProof="0" dirty="0" smtClean="0">
+                <a:ln>
+                  <a:noFill/>
+                </a:ln>
+                <a:solidFill>
+                  <a:srgbClr val="091D58"/>
+                </a:solidFill>
+                <a:effectLst/>
+                <a:uLnTx/>
+                <a:uFillTx/>
+              </a:rPr>
+              <a:t>× ≈ 6 dB</a:t>
             </a:r>
           </a:p>
           <a:p>
@@ -9794,7 +9802,7 @@
           <a:graphicData uri="http://schemas.openxmlformats.org/presentationml/2006/ole">
             <mc:AlternateContent xmlns:mc="http://schemas.openxmlformats.org/markup-compatibility/2006">
               <mc:Choice xmlns:v="urn:schemas-microsoft-com:vml" Requires="v">
-                <p:oleObj spid="_x0000_s2066" name="Equation" r:id="rId8" imgW="1346040" imgH="279360" progId="Equation.DSMT4">
+                <p:oleObj spid="_x0000_s2068" name="Equation" r:id="rId8" imgW="1346040" imgH="279360" progId="Equation.DSMT4">
                   <p:embed/>
                 </p:oleObj>
               </mc:Choice>
@@ -9847,7 +9855,7 @@
           <a:graphicData uri="http://schemas.openxmlformats.org/presentationml/2006/ole">
             <mc:AlternateContent xmlns:mc="http://schemas.openxmlformats.org/markup-compatibility/2006">
               <mc:Choice xmlns:v="urn:schemas-microsoft-com:vml" Requires="v">
-                <p:oleObj spid="_x0000_s2067" name="Equation" r:id="rId10" imgW="698400" imgH="482400" progId="Equation.DSMT4">
+                <p:oleObj spid="_x0000_s2069" name="Equation" r:id="rId10" imgW="698400" imgH="482400" progId="Equation.DSMT4">
                   <p:embed/>
                 </p:oleObj>
               </mc:Choice>

</xml_diff>